<commit_message>
working on figs for talk
</commit_message>
<xml_diff>
--- a/docs/figs.pptx
+++ b/docs/figs.pptx
@@ -204,7 +204,7 @@
           <a:p>
             <a:fld id="{4FBAF265-6143-EA4D-80A4-B61958D9683D}" type="datetimeFigureOut">
               <a:rPr lang="en-US" smtClean="0"/>
-              <a:t>17-11-06</a:t>
+              <a:t>17-11-30</a:t>
             </a:fld>
             <a:endParaRPr lang="en-US"/>
           </a:p>
@@ -728,23 +728,7 @@
             </a:r>
             <a:r>
               <a:rPr lang="en-US" baseline="0" dirty="0" smtClean="0"/>
-              <a:t> hypothesis pre-climate </a:t>
-            </a:r>
-            <a:r>
-              <a:rPr lang="en-US" baseline="0" dirty="0" smtClean="0"/>
-              <a:t>change (i.e. a ‘match’) </a:t>
-            </a:r>
-            <a:r>
-              <a:rPr lang="en-US" baseline="0" dirty="0" smtClean="0"/>
-              <a:t>(a) and under two different climate change scenarios: the consumer shifts its phenology more (b) or less than its resource (c) leading to </a:t>
-            </a:r>
-            <a:r>
-              <a:rPr lang="en-US" baseline="0" dirty="0" smtClean="0"/>
-              <a:t>a ‘mismatch’ </a:t>
-            </a:r>
-            <a:r>
-              <a:rPr lang="en-US" baseline="0" dirty="0" smtClean="0"/>
-              <a:t>in both cases (d). Red represents the consumer and black represents the resource.</a:t>
+              <a:t> hypothesis pre-climate change (i.e. a ‘match’) (a) and under two different climate change scenarios: the consumer shifts its phenology more (b) or less than its resource (c) leading to a ‘mismatch’ in both cases (d). Red represents the consumer and black represents the resource.</a:t>
             </a:r>
             <a:endParaRPr lang="en-US" dirty="0" smtClean="0"/>
           </a:p>
@@ -845,23 +829,7 @@
             </a:r>
             <a:r>
               <a:rPr lang="en-US" baseline="0" dirty="0" smtClean="0"/>
-              <a:t> hypothesis pre-climate </a:t>
-            </a:r>
-            <a:r>
-              <a:rPr lang="en-US" baseline="0" dirty="0" smtClean="0"/>
-              <a:t>change (i.e. a ‘match’) </a:t>
-            </a:r>
-            <a:r>
-              <a:rPr lang="en-US" baseline="0" dirty="0" smtClean="0"/>
-              <a:t>(a) and under two different climate change scenarios: the consumer shifts its phenology more (b) or less than its resource (c) leading to </a:t>
-            </a:r>
-            <a:r>
-              <a:rPr lang="en-US" baseline="0" dirty="0" smtClean="0"/>
-              <a:t>a ‘mismatch’ </a:t>
-            </a:r>
-            <a:r>
-              <a:rPr lang="en-US" baseline="0" dirty="0" smtClean="0"/>
-              <a:t>in both cases (d). Red represents the consumer and black represents the resource.</a:t>
+              <a:t> hypothesis pre-climate change (i.e. a ‘match’) (a) and under two different climate change scenarios: the consumer shifts its phenology more (b) or less than its resource (c) leading to a ‘mismatch’ in both cases (d). Red represents the consumer and black represents the resource.</a:t>
             </a:r>
             <a:endParaRPr lang="en-US" dirty="0" smtClean="0"/>
           </a:p>
@@ -1087,7 +1055,7 @@
           <a:p>
             <a:fld id="{7F396B13-CEA0-E54F-B6C3-F031D24201ED}" type="datetimeFigureOut">
               <a:rPr lang="en-US" smtClean="0"/>
-              <a:t>17-11-06</a:t>
+              <a:t>17-11-30</a:t>
             </a:fld>
             <a:endParaRPr lang="en-US"/>
           </a:p>
@@ -1257,7 +1225,7 @@
           <a:p>
             <a:fld id="{7F396B13-CEA0-E54F-B6C3-F031D24201ED}" type="datetimeFigureOut">
               <a:rPr lang="en-US" smtClean="0"/>
-              <a:t>17-11-06</a:t>
+              <a:t>17-11-30</a:t>
             </a:fld>
             <a:endParaRPr lang="en-US"/>
           </a:p>
@@ -1437,7 +1405,7 @@
           <a:p>
             <a:fld id="{7F396B13-CEA0-E54F-B6C3-F031D24201ED}" type="datetimeFigureOut">
               <a:rPr lang="en-US" smtClean="0"/>
-              <a:t>17-11-06</a:t>
+              <a:t>17-11-30</a:t>
             </a:fld>
             <a:endParaRPr lang="en-US"/>
           </a:p>
@@ -1607,7 +1575,7 @@
           <a:p>
             <a:fld id="{7F396B13-CEA0-E54F-B6C3-F031D24201ED}" type="datetimeFigureOut">
               <a:rPr lang="en-US" smtClean="0"/>
-              <a:t>17-11-06</a:t>
+              <a:t>17-11-30</a:t>
             </a:fld>
             <a:endParaRPr lang="en-US"/>
           </a:p>
@@ -1853,7 +1821,7 @@
           <a:p>
             <a:fld id="{7F396B13-CEA0-E54F-B6C3-F031D24201ED}" type="datetimeFigureOut">
               <a:rPr lang="en-US" smtClean="0"/>
-              <a:t>17-11-06</a:t>
+              <a:t>17-11-30</a:t>
             </a:fld>
             <a:endParaRPr lang="en-US"/>
           </a:p>
@@ -2141,7 +2109,7 @@
           <a:p>
             <a:fld id="{7F396B13-CEA0-E54F-B6C3-F031D24201ED}" type="datetimeFigureOut">
               <a:rPr lang="en-US" smtClean="0"/>
-              <a:t>17-11-06</a:t>
+              <a:t>17-11-30</a:t>
             </a:fld>
             <a:endParaRPr lang="en-US"/>
           </a:p>
@@ -2563,7 +2531,7 @@
           <a:p>
             <a:fld id="{7F396B13-CEA0-E54F-B6C3-F031D24201ED}" type="datetimeFigureOut">
               <a:rPr lang="en-US" smtClean="0"/>
-              <a:t>17-11-06</a:t>
+              <a:t>17-11-30</a:t>
             </a:fld>
             <a:endParaRPr lang="en-US"/>
           </a:p>
@@ -2681,7 +2649,7 @@
           <a:p>
             <a:fld id="{7F396B13-CEA0-E54F-B6C3-F031D24201ED}" type="datetimeFigureOut">
               <a:rPr lang="en-US" smtClean="0"/>
-              <a:t>17-11-06</a:t>
+              <a:t>17-11-30</a:t>
             </a:fld>
             <a:endParaRPr lang="en-US"/>
           </a:p>
@@ -2776,7 +2744,7 @@
           <a:p>
             <a:fld id="{7F396B13-CEA0-E54F-B6C3-F031D24201ED}" type="datetimeFigureOut">
               <a:rPr lang="en-US" smtClean="0"/>
-              <a:t>17-11-06</a:t>
+              <a:t>17-11-30</a:t>
             </a:fld>
             <a:endParaRPr lang="en-US"/>
           </a:p>
@@ -3053,7 +3021,7 @@
           <a:p>
             <a:fld id="{7F396B13-CEA0-E54F-B6C3-F031D24201ED}" type="datetimeFigureOut">
               <a:rPr lang="en-US" smtClean="0"/>
-              <a:t>17-11-06</a:t>
+              <a:t>17-11-30</a:t>
             </a:fld>
             <a:endParaRPr lang="en-US"/>
           </a:p>
@@ -3306,7 +3274,7 @@
           <a:p>
             <a:fld id="{7F396B13-CEA0-E54F-B6C3-F031D24201ED}" type="datetimeFigureOut">
               <a:rPr lang="en-US" smtClean="0"/>
-              <a:t>17-11-06</a:t>
+              <a:t>17-11-30</a:t>
             </a:fld>
             <a:endParaRPr lang="en-US"/>
           </a:p>
@@ -3519,7 +3487,7 @@
           <a:p>
             <a:fld id="{7F396B13-CEA0-E54F-B6C3-F031D24201ED}" type="datetimeFigureOut">
               <a:rPr lang="en-US" smtClean="0"/>
-              <a:t>17-11-06</a:t>
+              <a:t>17-11-30</a:t>
             </a:fld>
             <a:endParaRPr lang="en-US"/>
           </a:p>
@@ -5218,6 +5186,140 @@
           <a:chExt cx="0" cy="0"/>
         </a:xfrm>
       </p:grpSpPr>
+      <p:pic>
+        <p:nvPicPr>
+          <p:cNvPr id="10" name="Picture 9"/>
+          <p:cNvPicPr>
+            <a:picLocks noChangeAspect="1"/>
+          </p:cNvPicPr>
+          <p:nvPr/>
+        </p:nvPicPr>
+        <p:blipFill>
+          <a:blip r:embed="rId2"/>
+          <a:stretch>
+            <a:fillRect/>
+          </a:stretch>
+        </p:blipFill>
+        <p:spPr>
+          <a:xfrm>
+            <a:off x="338827" y="1219194"/>
+            <a:ext cx="5537037" cy="4706953"/>
+          </a:xfrm>
+          <a:prstGeom prst="rect">
+            <a:avLst/>
+          </a:prstGeom>
+        </p:spPr>
+      </p:pic>
+      <p:cxnSp>
+        <p:nvCxnSpPr>
+          <p:cNvPr id="3" name="Straight Connector 2"/>
+          <p:cNvCxnSpPr>
+            <a:endCxn id="5" idx="0"/>
+          </p:cNvCxnSpPr>
+          <p:nvPr/>
+        </p:nvCxnSpPr>
+        <p:spPr>
+          <a:xfrm>
+            <a:off x="3219695" y="2037376"/>
+            <a:ext cx="48232" cy="3094343"/>
+          </a:xfrm>
+          <a:prstGeom prst="line">
+            <a:avLst/>
+          </a:prstGeom>
+          <a:ln>
+            <a:solidFill>
+              <a:schemeClr val="tx1"/>
+            </a:solidFill>
+            <a:prstDash val="dash"/>
+          </a:ln>
+        </p:spPr>
+        <p:style>
+          <a:lnRef idx="2">
+            <a:schemeClr val="accent1"/>
+          </a:lnRef>
+          <a:fillRef idx="0">
+            <a:schemeClr val="accent1"/>
+          </a:fillRef>
+          <a:effectRef idx="1">
+            <a:schemeClr val="accent1"/>
+          </a:effectRef>
+          <a:fontRef idx="minor">
+            <a:schemeClr val="tx1"/>
+          </a:fontRef>
+        </p:style>
+      </p:cxnSp>
+      <p:sp>
+        <p:nvSpPr>
+          <p:cNvPr id="4" name="TextBox 3"/>
+          <p:cNvSpPr txBox="1"/>
+          <p:nvPr/>
+        </p:nvSpPr>
+        <p:spPr>
+          <a:xfrm>
+            <a:off x="2575170" y="1832534"/>
+            <a:ext cx="1370297" cy="430887"/>
+          </a:xfrm>
+          <a:prstGeom prst="rect">
+            <a:avLst/>
+          </a:prstGeom>
+          <a:solidFill>
+            <a:schemeClr val="tx2">
+              <a:lumMod val="40000"/>
+              <a:lumOff val="60000"/>
+            </a:schemeClr>
+          </a:solidFill>
+          <a:ln>
+            <a:solidFill>
+              <a:schemeClr val="tx1"/>
+            </a:solidFill>
+            <a:prstDash val="solid"/>
+          </a:ln>
+        </p:spPr>
+        <p:txBody>
+          <a:bodyPr wrap="square" rtlCol="0">
+            <a:spAutoFit/>
+          </a:bodyPr>
+          <a:lstStyle/>
+          <a:p>
+            <a:pPr algn="ctr"/>
+            <a:r>
+              <a:rPr lang="en-US" sz="2200" b="1" dirty="0" smtClean="0"/>
+              <a:t>Baseline?</a:t>
+            </a:r>
+            <a:endParaRPr lang="en-US" sz="2200" b="1" dirty="0"/>
+          </a:p>
+        </p:txBody>
+      </p:sp>
+      <p:sp>
+        <p:nvSpPr>
+          <p:cNvPr id="5" name="TextBox 4"/>
+          <p:cNvSpPr txBox="1"/>
+          <p:nvPr/>
+        </p:nvSpPr>
+        <p:spPr>
+          <a:xfrm>
+            <a:off x="3117097" y="5131719"/>
+            <a:ext cx="301660" cy="369332"/>
+          </a:xfrm>
+          <a:prstGeom prst="rect">
+            <a:avLst/>
+          </a:prstGeom>
+          <a:noFill/>
+        </p:spPr>
+        <p:txBody>
+          <a:bodyPr wrap="none" rtlCol="0">
+            <a:spAutoFit/>
+          </a:bodyPr>
+          <a:lstStyle/>
+          <a:p>
+            <a:r>
+              <a:rPr lang="en-US" dirty="0" smtClean="0"/>
+              <a:t>0</a:t>
+            </a:r>
+            <a:endParaRPr lang="en-US" dirty="0"/>
+          </a:p>
+        </p:txBody>
+      </p:sp>
     </p:spTree>
     <p:extLst>
       <p:ext uri="{BB962C8B-B14F-4D97-AF65-F5344CB8AC3E}">
@@ -5544,11 +5646,7 @@
                 <a:pPr algn="ctr"/>
                 <a:r>
                   <a:rPr lang="en-US" sz="2200" b="1" dirty="0" smtClean="0"/>
-                  <a:t>m</a:t>
-                </a:r>
-                <a:r>
-                  <a:rPr lang="en-US" sz="2200" b="1" dirty="0" smtClean="0"/>
-                  <a:t>atch</a:t>
+                  <a:t>match</a:t>
                 </a:r>
                 <a:endParaRPr lang="en-US" sz="2200" b="1" dirty="0"/>
               </a:p>

</xml_diff>